<commit_message>
split branching and tags into 2 separate files.
</commit_message>
<xml_diff>
--- a/Branching Strategy (Basic).pptx
+++ b/Branching Strategy (Basic).pptx
@@ -293,7 +293,7 @@
           <a:p>
             <a:fld id="{8839E6B8-AE44-4E4D-B3CE-5639A35B70C6}" type="datetimeFigureOut">
               <a:rPr lang="en-SG" smtClean="0"/>
-              <a:t>1/4/2013</a:t>
+              <a:t>4/4/2013</a:t>
             </a:fld>
             <a:endParaRPr lang="en-SG"/>
           </a:p>
@@ -463,7 +463,7 @@
           <a:p>
             <a:fld id="{8839E6B8-AE44-4E4D-B3CE-5639A35B70C6}" type="datetimeFigureOut">
               <a:rPr lang="en-SG" smtClean="0"/>
-              <a:t>1/4/2013</a:t>
+              <a:t>4/4/2013</a:t>
             </a:fld>
             <a:endParaRPr lang="en-SG"/>
           </a:p>
@@ -643,7 +643,7 @@
           <a:p>
             <a:fld id="{8839E6B8-AE44-4E4D-B3CE-5639A35B70C6}" type="datetimeFigureOut">
               <a:rPr lang="en-SG" smtClean="0"/>
-              <a:t>1/4/2013</a:t>
+              <a:t>4/4/2013</a:t>
             </a:fld>
             <a:endParaRPr lang="en-SG"/>
           </a:p>
@@ -813,7 +813,7 @@
           <a:p>
             <a:fld id="{8839E6B8-AE44-4E4D-B3CE-5639A35B70C6}" type="datetimeFigureOut">
               <a:rPr lang="en-SG" smtClean="0"/>
-              <a:t>1/4/2013</a:t>
+              <a:t>4/4/2013</a:t>
             </a:fld>
             <a:endParaRPr lang="en-SG"/>
           </a:p>
@@ -1059,7 +1059,7 @@
           <a:p>
             <a:fld id="{8839E6B8-AE44-4E4D-B3CE-5639A35B70C6}" type="datetimeFigureOut">
               <a:rPr lang="en-SG" smtClean="0"/>
-              <a:t>1/4/2013</a:t>
+              <a:t>4/4/2013</a:t>
             </a:fld>
             <a:endParaRPr lang="en-SG"/>
           </a:p>
@@ -1347,7 +1347,7 @@
           <a:p>
             <a:fld id="{8839E6B8-AE44-4E4D-B3CE-5639A35B70C6}" type="datetimeFigureOut">
               <a:rPr lang="en-SG" smtClean="0"/>
-              <a:t>1/4/2013</a:t>
+              <a:t>4/4/2013</a:t>
             </a:fld>
             <a:endParaRPr lang="en-SG"/>
           </a:p>
@@ -1769,7 +1769,7 @@
           <a:p>
             <a:fld id="{8839E6B8-AE44-4E4D-B3CE-5639A35B70C6}" type="datetimeFigureOut">
               <a:rPr lang="en-SG" smtClean="0"/>
-              <a:t>1/4/2013</a:t>
+              <a:t>4/4/2013</a:t>
             </a:fld>
             <a:endParaRPr lang="en-SG"/>
           </a:p>
@@ -1887,7 +1887,7 @@
           <a:p>
             <a:fld id="{8839E6B8-AE44-4E4D-B3CE-5639A35B70C6}" type="datetimeFigureOut">
               <a:rPr lang="en-SG" smtClean="0"/>
-              <a:t>1/4/2013</a:t>
+              <a:t>4/4/2013</a:t>
             </a:fld>
             <a:endParaRPr lang="en-SG"/>
           </a:p>
@@ -1982,7 +1982,7 @@
           <a:p>
             <a:fld id="{8839E6B8-AE44-4E4D-B3CE-5639A35B70C6}" type="datetimeFigureOut">
               <a:rPr lang="en-SG" smtClean="0"/>
-              <a:t>1/4/2013</a:t>
+              <a:t>4/4/2013</a:t>
             </a:fld>
             <a:endParaRPr lang="en-SG"/>
           </a:p>
@@ -2259,7 +2259,7 @@
           <a:p>
             <a:fld id="{8839E6B8-AE44-4E4D-B3CE-5639A35B70C6}" type="datetimeFigureOut">
               <a:rPr lang="en-SG" smtClean="0"/>
-              <a:t>1/4/2013</a:t>
+              <a:t>4/4/2013</a:t>
             </a:fld>
             <a:endParaRPr lang="en-SG"/>
           </a:p>
@@ -2512,7 +2512,7 @@
           <a:p>
             <a:fld id="{8839E6B8-AE44-4E4D-B3CE-5639A35B70C6}" type="datetimeFigureOut">
               <a:rPr lang="en-SG" smtClean="0"/>
-              <a:t>1/4/2013</a:t>
+              <a:t>4/4/2013</a:t>
             </a:fld>
             <a:endParaRPr lang="en-SG"/>
           </a:p>
@@ -2725,7 +2725,7 @@
           <a:p>
             <a:fld id="{8839E6B8-AE44-4E4D-B3CE-5639A35B70C6}" type="datetimeFigureOut">
               <a:rPr lang="en-SG" smtClean="0"/>
-              <a:t>1/4/2013</a:t>
+              <a:t>4/4/2013</a:t>
             </a:fld>
             <a:endParaRPr lang="en-SG"/>
           </a:p>
@@ -3212,13 +3212,62 @@
             <p:ph idx="1"/>
           </p:nvPr>
         </p:nvSpPr>
-        <p:spPr/>
+        <p:spPr>
+          <a:xfrm>
+            <a:off x="457200" y="1600200"/>
+            <a:ext cx="8229600" cy="4997152"/>
+          </a:xfrm>
+        </p:spPr>
         <p:txBody>
           <a:bodyPr>
-            <a:normAutofit/>
+            <a:normAutofit lnSpcReduction="10000"/>
           </a:bodyPr>
           <a:lstStyle/>
           <a:p>
+            <a:pPr marL="0" indent="0">
+              <a:buNone/>
+            </a:pPr>
+            <a:r>
+              <a:rPr lang="en-US" dirty="0" smtClean="0"/>
+              <a:t>There are several strategies you can use for your project, depending on the number of people you have. They are:</a:t>
+            </a:r>
+            <a:endParaRPr lang="en-US" dirty="0" smtClean="0"/>
+          </a:p>
+          <a:p>
+            <a:pPr marL="0" indent="0">
+              <a:buNone/>
+            </a:pPr>
+            <a:r>
+              <a:rPr lang="en-US" dirty="0" smtClean="0"/>
+              <a:t>Individual</a:t>
+            </a:r>
+          </a:p>
+          <a:p>
+            <a:pPr marL="0" indent="0">
+              <a:buNone/>
+            </a:pPr>
+            <a:r>
+              <a:rPr lang="en-US" dirty="0" smtClean="0"/>
+              <a:t>Small Team (2-4 people)</a:t>
+            </a:r>
+          </a:p>
+          <a:p>
+            <a:pPr marL="0" indent="0">
+              <a:buNone/>
+            </a:pPr>
+            <a:r>
+              <a:rPr lang="en-US" dirty="0" smtClean="0"/>
+              <a:t>Large Team (5 or more)</a:t>
+            </a:r>
+          </a:p>
+          <a:p>
+            <a:pPr marL="0" indent="0">
+              <a:buNone/>
+            </a:pPr>
+            <a:r>
+              <a:rPr lang="en-US" dirty="0" smtClean="0"/>
+              <a:t>In this tutorial, we will consider the Individual a subset of the Small Team, because the strategy is largely the same, maybe just a little simple than a Small Team strategy.</a:t>
+            </a:r>
             <a:endParaRPr lang="en-SG" dirty="0"/>
           </a:p>
         </p:txBody>
@@ -3294,7 +3343,18 @@
           <a:bodyPr/>
           <a:lstStyle/>
           <a:p>
-            <a:endParaRPr lang="en-SG"/>
+            <a:pPr marL="0" indent="0">
+              <a:buNone/>
+            </a:pPr>
+            <a:r>
+              <a:rPr lang="en-US" dirty="0" smtClean="0"/>
+              <a:t>As with any project, you start of with a master branch. Next you create a develop branch, so that you can work on new stuff without breaking the stable code in the </a:t>
+            </a:r>
+            <a:r>
+              <a:rPr lang="en-US" smtClean="0"/>
+              <a:t>master branch.</a:t>
+            </a:r>
+            <a:endParaRPr lang="en-SG" dirty="0"/>
           </a:p>
         </p:txBody>
       </p:sp>
@@ -3308,6 +3368,13 @@
   <p:clrMapOvr>
     <a:masterClrMapping/>
   </p:clrMapOvr>
+  <p:timing>
+    <p:tnLst>
+      <p:par>
+        <p:cTn id="1" dur="indefinite" restart="never" nodeType="tmRoot"/>
+      </p:par>
+    </p:tnLst>
+  </p:timing>
 </p:sld>
 </file>
 

</xml_diff>

<commit_message>
completed Branching Strategy Basic
</commit_message>
<xml_diff>
--- a/Branching Strategy (Basic).pptx
+++ b/Branching Strategy (Basic).pptx
@@ -3117,11 +3117,7 @@
           <a:p>
             <a:r>
               <a:rPr lang="en-US" dirty="0" smtClean="0"/>
-              <a:t>Branching </a:t>
-            </a:r>
-            <a:r>
-              <a:rPr lang="en-US" dirty="0" smtClean="0"/>
-              <a:t>Strategy (Basic)</a:t>
+              <a:t>Branching Strategy (Basic)</a:t>
             </a:r>
             <a:endParaRPr lang="en-SG" dirty="0"/>
           </a:p>
@@ -3202,6 +3198,10 @@
           <a:bodyPr/>
           <a:lstStyle/>
           <a:p>
+            <a:r>
+              <a:rPr lang="en-US" dirty="0"/>
+              <a:t>Branching Strategy (Basic)</a:t>
+            </a:r>
             <a:endParaRPr lang="en-SG" dirty="0"/>
           </a:p>
         </p:txBody>
@@ -3260,13 +3260,8 @@
             </a:pPr>
             <a:r>
               <a:rPr lang="en-US" dirty="0" smtClean="0"/>
-              <a:t>Large Team (5 or more</a:t>
-            </a:r>
-            <a:r>
-              <a:rPr lang="en-US" dirty="0" smtClean="0"/>
-              <a:t>) (This is covered in Branching Strategy (Advanced))</a:t>
-            </a:r>
-            <a:endParaRPr lang="en-US" dirty="0" smtClean="0"/>
+              <a:t>Large Team (5 or more) (This is covered in Branching Strategy (Advanced))</a:t>
+            </a:r>
           </a:p>
         </p:txBody>
       </p:sp>
@@ -3322,7 +3317,11 @@
           <a:bodyPr/>
           <a:lstStyle/>
           <a:p>
-            <a:endParaRPr lang="en-SG"/>
+            <a:r>
+              <a:rPr lang="en-US" dirty="0"/>
+              <a:t>Branching Strategy (Basic)</a:t>
+            </a:r>
+            <a:endParaRPr lang="en-SG" dirty="0"/>
           </a:p>
         </p:txBody>
       </p:sp>
@@ -3361,11 +3360,7 @@
             </a:pPr>
             <a:r>
               <a:rPr lang="en-US" dirty="0" smtClean="0"/>
-              <a:t>So, as </a:t>
-            </a:r>
-            <a:r>
-              <a:rPr lang="en-US" dirty="0" smtClean="0"/>
-              <a:t>with any project, you start of with a master branch. Next you create a develop branch, so that you can work on new stuff without breaking the stable code in the master branch.</a:t>
+              <a:t>So, as with any project, you start of with a master branch. Next you create a develop branch, so that you can work on new stuff without breaking the stable code in the master branch.</a:t>
             </a:r>
             <a:endParaRPr lang="en-SG" dirty="0"/>
           </a:p>
@@ -3423,7 +3418,11 @@
           <a:bodyPr/>
           <a:lstStyle/>
           <a:p>
-            <a:endParaRPr lang="en-SG"/>
+            <a:r>
+              <a:rPr lang="en-US" dirty="0"/>
+              <a:t>Branching Strategy (Basic)</a:t>
+            </a:r>
+            <a:endParaRPr lang="en-SG" dirty="0"/>
           </a:p>
         </p:txBody>
       </p:sp>
@@ -3447,7 +3446,11 @@
             </a:pPr>
             <a:r>
               <a:rPr lang="en-US" dirty="0" smtClean="0"/>
-              <a:t>For small teams and individuals, that's more or less it. All of you can work on and commit to the develop branch. It's much more lax than working in a big team, because anyone can do merging of branches. At anytime, a member may branch off from the develop branch, work on a feature and once the feature is done, merge it back to the develop branch, then delete the feature branch, all on his own</a:t>
+              <a:t>For small teams and individuals, that's more or less it. All of you can work on and commit to the develop branch. It's much more lax than working in a big team, because anyone can do merging of branches. At anytime, a member may branch off from the develop branch, work on a feature and once the feature is done, merge it back to the develop branch, then delete the feature branch, all on his </a:t>
+            </a:r>
+            <a:r>
+              <a:rPr lang="en-US" dirty="0" smtClean="0"/>
+              <a:t>own.</a:t>
             </a:r>
             <a:endParaRPr lang="en-SG" dirty="0"/>
           </a:p>
@@ -3505,7 +3508,11 @@
           <a:bodyPr/>
           <a:lstStyle/>
           <a:p>
-            <a:endParaRPr lang="en-SG"/>
+            <a:r>
+              <a:rPr lang="en-US" dirty="0"/>
+              <a:t>Branching Strategy (Basic)</a:t>
+            </a:r>
+            <a:endParaRPr lang="en-SG" dirty="0"/>
           </a:p>
         </p:txBody>
       </p:sp>
@@ -3521,8 +3528,8 @@
         </p:nvSpPr>
         <p:spPr>
           <a:xfrm>
-            <a:off x="457200" y="1600200"/>
-            <a:ext cx="8229600" cy="4997152"/>
+            <a:off x="457200" y="1484784"/>
+            <a:ext cx="8229600" cy="5112568"/>
           </a:xfrm>
         </p:spPr>
         <p:txBody>
@@ -3536,16 +3543,30 @@
             </a:pPr>
             <a:r>
               <a:rPr lang="en-US" dirty="0" smtClean="0"/>
-              <a:t>The main differences between small teams and large ones are the restriction of merging branches (not everyone should do it), rebasing and versioning, all of which </a:t>
-            </a:r>
-            <a:r>
-              <a:rPr lang="en-US" smtClean="0"/>
-              <a:t>will be </a:t>
+              <a:t>The main differences between small teams and large ones are the restriction of merging branches </a:t>
             </a:r>
             <a:r>
               <a:rPr lang="en-US" dirty="0" smtClean="0"/>
-              <a:t>covered in the advanced section.</a:t>
-            </a:r>
+              <a:t>(only one person handles merging), </a:t>
+            </a:r>
+            <a:r>
+              <a:rPr lang="en-US" dirty="0" smtClean="0"/>
+              <a:t>rebasing and versioning, all of which will be covered in the advanced section</a:t>
+            </a:r>
+            <a:r>
+              <a:rPr lang="en-US" dirty="0" smtClean="0"/>
+              <a:t>.</a:t>
+            </a:r>
+          </a:p>
+          <a:p>
+            <a:pPr marL="0" indent="0">
+              <a:buNone/>
+            </a:pPr>
+            <a:r>
+              <a:rPr lang="en-US" dirty="0" smtClean="0"/>
+              <a:t>The differences between individual and a small team are that there probably will be lesser merge conflicts, you don't have to constantly pull code and you don't have to make a new branch to work on a new feature.</a:t>
+            </a:r>
+            <a:endParaRPr lang="en-US" dirty="0" smtClean="0"/>
           </a:p>
         </p:txBody>
       </p:sp>
@@ -3601,7 +3622,11 @@
           <a:bodyPr/>
           <a:lstStyle/>
           <a:p>
-            <a:endParaRPr lang="en-SG"/>
+            <a:r>
+              <a:rPr lang="en-US" dirty="0"/>
+              <a:t>Branching Strategy (Basic)</a:t>
+            </a:r>
+            <a:endParaRPr lang="en-SG" dirty="0"/>
           </a:p>
         </p:txBody>
       </p:sp>
@@ -3629,7 +3654,15 @@
             </a:r>
             <a:r>
               <a:rPr lang="en-US" dirty="0" smtClean="0"/>
-              <a:t>. Thus, this is more or less what your branches would look like:</a:t>
+              <a:t>. Thus, this is more or less what your </a:t>
+            </a:r>
+            <a:r>
+              <a:rPr lang="en-US" smtClean="0"/>
+              <a:t>project branches would </a:t>
+            </a:r>
+            <a:r>
+              <a:rPr lang="en-US" dirty="0" smtClean="0"/>
+              <a:t>look like:</a:t>
             </a:r>
           </a:p>
           <a:p>

</xml_diff>

<commit_message>
tweaked Branching Strategy (Basic)
</commit_message>
<xml_diff>
--- a/Branching Strategy (Basic).pptx
+++ b/Branching Strategy (Basic).pptx
@@ -3350,7 +3350,15 @@
             </a:pPr>
             <a:r>
               <a:rPr lang="en-US" dirty="0"/>
-              <a:t>In this tutorial, we will consider the Individual a subset of the Small Team, because the strategy is largely the same, maybe just a little simple than a Small Team strategy.</a:t>
+              <a:t>In this tutorial, we will consider the Individual a subset of the Small Team, because the strategy is largely the same, maybe just a little </a:t>
+            </a:r>
+            <a:r>
+              <a:rPr lang="en-US" dirty="0" smtClean="0"/>
+              <a:t>simpler than </a:t>
+            </a:r>
+            <a:r>
+              <a:rPr lang="en-US" dirty="0"/>
+              <a:t>a Small Team strategy.</a:t>
             </a:r>
             <a:endParaRPr lang="en-SG" dirty="0"/>
           </a:p>
@@ -3360,7 +3368,15 @@
             </a:pPr>
             <a:r>
               <a:rPr lang="en-US" dirty="0" smtClean="0"/>
-              <a:t>So, as with any project, you start of with a master branch. Next you create a develop branch, so that you can work on new stuff without breaking the stable code in the master branch.</a:t>
+              <a:t>So, as with any project, you </a:t>
+            </a:r>
+            <a:r>
+              <a:rPr lang="en-US" dirty="0" smtClean="0"/>
+              <a:t>start </a:t>
+            </a:r>
+            <a:r>
+              <a:rPr lang="en-US" dirty="0" smtClean="0"/>
+              <a:t>with a master branch. Next you create a develop branch, so that you can work on new stuff without breaking the stable code in the master branch.</a:t>
             </a:r>
             <a:endParaRPr lang="en-SG" dirty="0"/>
           </a:p>
@@ -3446,11 +3462,7 @@
             </a:pPr>
             <a:r>
               <a:rPr lang="en-US" dirty="0" smtClean="0"/>
-              <a:t>For small teams and individuals, that's more or less it. All of you can work on and commit to the develop branch. It's much more lax than working in a big team, because anyone can do merging of branches. At anytime, a member may branch off from the develop branch, work on a feature and once the feature is done, merge it back to the develop branch, then delete the feature branch, all on his </a:t>
-            </a:r>
-            <a:r>
-              <a:rPr lang="en-US" dirty="0" smtClean="0"/>
-              <a:t>own.</a:t>
+              <a:t>For small teams and individuals, that's more or less it. All of you can work on and commit to the develop branch. It's much more lax than working in a big team, because anyone can do merging of branches. At anytime, a member may branch off from the develop branch, work on a feature and once the feature is done, merge it back to the develop branch, then delete the feature branch, all on his own.</a:t>
             </a:r>
             <a:endParaRPr lang="en-SG" dirty="0"/>
           </a:p>
@@ -3543,19 +3555,7 @@
             </a:pPr>
             <a:r>
               <a:rPr lang="en-US" dirty="0" smtClean="0"/>
-              <a:t>The main differences between small teams and large ones are the restriction of merging branches </a:t>
-            </a:r>
-            <a:r>
-              <a:rPr lang="en-US" dirty="0" smtClean="0"/>
-              <a:t>(only one person handles merging), </a:t>
-            </a:r>
-            <a:r>
-              <a:rPr lang="en-US" dirty="0" smtClean="0"/>
-              <a:t>rebasing and versioning, all of which will be covered in the advanced section</a:t>
-            </a:r>
-            <a:r>
-              <a:rPr lang="en-US" dirty="0" smtClean="0"/>
-              <a:t>.</a:t>
+              <a:t>The main differences between small teams and large ones are the restriction of merging branches (only one person handles merging), rebasing and versioning, all of which will be covered in the advanced section.</a:t>
             </a:r>
           </a:p>
           <a:p>
@@ -3566,7 +3566,6 @@
               <a:rPr lang="en-US" dirty="0" smtClean="0"/>
               <a:t>The differences between individual and a small team are that there probably will be lesser merge conflicts, you don't have to constantly pull code and you don't have to make a new branch to work on a new feature.</a:t>
             </a:r>
-            <a:endParaRPr lang="en-US" dirty="0" smtClean="0"/>
           </a:p>
         </p:txBody>
       </p:sp>
@@ -3654,15 +3653,7 @@
             </a:r>
             <a:r>
               <a:rPr lang="en-US" dirty="0" smtClean="0"/>
-              <a:t>. Thus, this is more or less what your </a:t>
-            </a:r>
-            <a:r>
-              <a:rPr lang="en-US" smtClean="0"/>
-              <a:t>project branches would </a:t>
-            </a:r>
-            <a:r>
-              <a:rPr lang="en-US" dirty="0" smtClean="0"/>
-              <a:t>look like:</a:t>
+              <a:t>. Thus, this is more or less what your project branches would look like:</a:t>
             </a:r>
           </a:p>
           <a:p>
@@ -3681,7 +3672,7 @@
       </p:sp>
       <p:grpSp>
         <p:nvGrpSpPr>
-          <p:cNvPr id="26" name="Group 25"/>
+          <p:cNvPr id="4" name="Group 3"/>
           <p:cNvGrpSpPr/>
           <p:nvPr/>
         </p:nvGrpSpPr>
@@ -3800,158 +3791,6 @@
                 <a:t>master</a:t>
               </a:r>
               <a:endParaRPr lang="en-SG" dirty="0"/>
-            </a:p>
-          </p:txBody>
-        </p:sp>
-        <p:sp>
-          <p:nvSpPr>
-            <p:cNvPr id="8" name="Oval 7"/>
-            <p:cNvSpPr/>
-            <p:nvPr/>
-          </p:nvSpPr>
-          <p:spPr>
-            <a:xfrm>
-              <a:off x="917136" y="4634178"/>
-              <a:ext cx="256674" cy="256674"/>
-            </a:xfrm>
-            <a:prstGeom prst="ellipse">
-              <a:avLst/>
-            </a:prstGeom>
-          </p:spPr>
-          <p:style>
-            <a:lnRef idx="1">
-              <a:schemeClr val="accent6"/>
-            </a:lnRef>
-            <a:fillRef idx="3">
-              <a:schemeClr val="accent6"/>
-            </a:fillRef>
-            <a:effectRef idx="2">
-              <a:schemeClr val="accent6"/>
-            </a:effectRef>
-            <a:fontRef idx="minor">
-              <a:schemeClr val="lt1"/>
-            </a:fontRef>
-          </p:style>
-          <p:txBody>
-            <a:bodyPr rtlCol="0" anchor="ctr"/>
-            <a:lstStyle/>
-            <a:p>
-              <a:pPr algn="ctr"/>
-              <a:endParaRPr lang="en-SG"/>
-            </a:p>
-          </p:txBody>
-        </p:sp>
-        <p:sp>
-          <p:nvSpPr>
-            <p:cNvPr id="9" name="Oval 8"/>
-            <p:cNvSpPr/>
-            <p:nvPr/>
-          </p:nvSpPr>
-          <p:spPr>
-            <a:xfrm>
-              <a:off x="1326210" y="4634178"/>
-              <a:ext cx="256674" cy="256674"/>
-            </a:xfrm>
-            <a:prstGeom prst="ellipse">
-              <a:avLst/>
-            </a:prstGeom>
-          </p:spPr>
-          <p:style>
-            <a:lnRef idx="1">
-              <a:schemeClr val="accent6"/>
-            </a:lnRef>
-            <a:fillRef idx="3">
-              <a:schemeClr val="accent6"/>
-            </a:fillRef>
-            <a:effectRef idx="2">
-              <a:schemeClr val="accent6"/>
-            </a:effectRef>
-            <a:fontRef idx="minor">
-              <a:schemeClr val="lt1"/>
-            </a:fontRef>
-          </p:style>
-          <p:txBody>
-            <a:bodyPr rtlCol="0" anchor="ctr"/>
-            <a:lstStyle/>
-            <a:p>
-              <a:pPr algn="ctr"/>
-              <a:endParaRPr lang="en-SG"/>
-            </a:p>
-          </p:txBody>
-        </p:sp>
-        <p:sp>
-          <p:nvSpPr>
-            <p:cNvPr id="10" name="Oval 9"/>
-            <p:cNvSpPr/>
-            <p:nvPr/>
-          </p:nvSpPr>
-          <p:spPr>
-            <a:xfrm>
-              <a:off x="2269609" y="4634178"/>
-              <a:ext cx="256674" cy="256674"/>
-            </a:xfrm>
-            <a:prstGeom prst="ellipse">
-              <a:avLst/>
-            </a:prstGeom>
-          </p:spPr>
-          <p:style>
-            <a:lnRef idx="1">
-              <a:schemeClr val="accent6"/>
-            </a:lnRef>
-            <a:fillRef idx="3">
-              <a:schemeClr val="accent6"/>
-            </a:fillRef>
-            <a:effectRef idx="2">
-              <a:schemeClr val="accent6"/>
-            </a:effectRef>
-            <a:fontRef idx="minor">
-              <a:schemeClr val="lt1"/>
-            </a:fontRef>
-          </p:style>
-          <p:txBody>
-            <a:bodyPr rtlCol="0" anchor="ctr"/>
-            <a:lstStyle/>
-            <a:p>
-              <a:pPr algn="ctr"/>
-              <a:endParaRPr lang="en-SG"/>
-            </a:p>
-          </p:txBody>
-        </p:sp>
-        <p:sp>
-          <p:nvSpPr>
-            <p:cNvPr id="11" name="Oval 10"/>
-            <p:cNvSpPr/>
-            <p:nvPr/>
-          </p:nvSpPr>
-          <p:spPr>
-            <a:xfrm>
-              <a:off x="3421737" y="4634178"/>
-              <a:ext cx="256674" cy="256674"/>
-            </a:xfrm>
-            <a:prstGeom prst="ellipse">
-              <a:avLst/>
-            </a:prstGeom>
-          </p:spPr>
-          <p:style>
-            <a:lnRef idx="1">
-              <a:schemeClr val="accent6"/>
-            </a:lnRef>
-            <a:fillRef idx="3">
-              <a:schemeClr val="accent6"/>
-            </a:fillRef>
-            <a:effectRef idx="2">
-              <a:schemeClr val="accent6"/>
-            </a:effectRef>
-            <a:fontRef idx="minor">
-              <a:schemeClr val="lt1"/>
-            </a:fontRef>
-          </p:style>
-          <p:txBody>
-            <a:bodyPr rtlCol="0" anchor="ctr"/>
-            <a:lstStyle/>
-            <a:p>
-              <a:pPr algn="ctr"/>
-              <a:endParaRPr lang="en-SG"/>
             </a:p>
           </p:txBody>
         </p:sp>
@@ -4219,6 +4058,46 @@
         </p:sp>
         <p:sp>
           <p:nvSpPr>
+            <p:cNvPr id="27" name="Rectangle 26"/>
+            <p:cNvSpPr/>
+            <p:nvPr/>
+          </p:nvSpPr>
+          <p:spPr>
+            <a:xfrm rot="6598988">
+              <a:off x="1885694" y="5146281"/>
+              <a:ext cx="810204" cy="72000"/>
+            </a:xfrm>
+            <a:prstGeom prst="rect">
+              <a:avLst/>
+            </a:prstGeom>
+          </p:spPr>
+          <p:style>
+            <a:lnRef idx="2">
+              <a:schemeClr val="accent1">
+                <a:shade val="50000"/>
+              </a:schemeClr>
+            </a:lnRef>
+            <a:fillRef idx="1">
+              <a:schemeClr val="accent1"/>
+            </a:fillRef>
+            <a:effectRef idx="0">
+              <a:schemeClr val="accent1"/>
+            </a:effectRef>
+            <a:fontRef idx="minor">
+              <a:schemeClr val="lt1"/>
+            </a:fontRef>
+          </p:style>
+          <p:txBody>
+            <a:bodyPr rtlCol="0" anchor="ctr"/>
+            <a:lstStyle/>
+            <a:p>
+              <a:pPr algn="ctr"/>
+              <a:endParaRPr lang="en-SG"/>
+            </a:p>
+          </p:txBody>
+        </p:sp>
+        <p:sp>
+          <p:nvSpPr>
             <p:cNvPr id="19" name="Oval 18"/>
             <p:cNvSpPr/>
             <p:nvPr/>
@@ -4442,6 +4321,44 @@
             <a:p>
               <a:pPr algn="ctr"/>
               <a:endParaRPr lang="en-SG" dirty="0"/>
+            </a:p>
+          </p:txBody>
+        </p:sp>
+        <p:sp>
+          <p:nvSpPr>
+            <p:cNvPr id="10" name="Oval 9"/>
+            <p:cNvSpPr/>
+            <p:nvPr/>
+          </p:nvSpPr>
+          <p:spPr>
+            <a:xfrm>
+              <a:off x="2269609" y="4634178"/>
+              <a:ext cx="256674" cy="256674"/>
+            </a:xfrm>
+            <a:prstGeom prst="ellipse">
+              <a:avLst/>
+            </a:prstGeom>
+          </p:spPr>
+          <p:style>
+            <a:lnRef idx="1">
+              <a:schemeClr val="accent6"/>
+            </a:lnRef>
+            <a:fillRef idx="3">
+              <a:schemeClr val="accent6"/>
+            </a:fillRef>
+            <a:effectRef idx="2">
+              <a:schemeClr val="accent6"/>
+            </a:effectRef>
+            <a:fontRef idx="minor">
+              <a:schemeClr val="lt1"/>
+            </a:fontRef>
+          </p:style>
+          <p:txBody>
+            <a:bodyPr rtlCol="0" anchor="ctr"/>
+            <a:lstStyle/>
+            <a:p>
+              <a:pPr algn="ctr"/>
+              <a:endParaRPr lang="en-SG"/>
             </a:p>
           </p:txBody>
         </p:sp>

</xml_diff>